<commit_message>
Added modified ntuple variables to track pion end momentum
</commit_message>
<xml_diff>
--- a/Plots:Slides/01:07:2024/Andy Zhang – Jul 1st Update.pptx
+++ b/Plots:Slides/01:07:2024/Andy Zhang – Jul 1st Update.pptx
@@ -343,7 +343,7 @@
           <a:p>
             <a:fld id="{C485584D-7D79-4248-9986-4CA35242F944}" type="datetimeFigureOut">
               <a:rPr lang="en-US" smtClean="0"/>
-              <a:t>6/28/24</a:t>
+              <a:t>7/15/24</a:t>
             </a:fld>
             <a:endParaRPr lang="en-US"/>
           </a:p>
@@ -717,7 +717,7 @@
           <a:p>
             <a:fld id="{C485584D-7D79-4248-9986-4CA35242F944}" type="datetimeFigureOut">
               <a:rPr lang="en-US" smtClean="0"/>
-              <a:t>6/28/24</a:t>
+              <a:t>7/15/24</a:t>
             </a:fld>
             <a:endParaRPr lang="en-US"/>
           </a:p>
@@ -927,7 +927,7 @@
           <a:p>
             <a:fld id="{C485584D-7D79-4248-9986-4CA35242F944}" type="datetimeFigureOut">
               <a:rPr lang="en-US" smtClean="0"/>
-              <a:t>6/28/24</a:t>
+              <a:t>7/15/24</a:t>
             </a:fld>
             <a:endParaRPr lang="en-US"/>
           </a:p>
@@ -1126,7 +1126,7 @@
           <a:p>
             <a:fld id="{C485584D-7D79-4248-9986-4CA35242F944}" type="datetimeFigureOut">
               <a:rPr lang="en-US" smtClean="0"/>
-              <a:t>6/28/24</a:t>
+              <a:t>7/15/24</a:t>
             </a:fld>
             <a:endParaRPr lang="en-US"/>
           </a:p>
@@ -1239,7 +1239,7 @@
           <a:p>
             <a:fld id="{C485584D-7D79-4248-9986-4CA35242F944}" type="datetimeFigureOut">
               <a:rPr lang="en-US" smtClean="0"/>
-              <a:t>6/28/24</a:t>
+              <a:t>7/15/24</a:t>
             </a:fld>
             <a:endParaRPr lang="en-US"/>
           </a:p>
@@ -1975,7 +1975,7 @@
           <a:p>
             <a:fld id="{C485584D-7D79-4248-9986-4CA35242F944}" type="datetimeFigureOut">
               <a:rPr lang="en-US" smtClean="0"/>
-              <a:t>6/28/24</a:t>
+              <a:t>7/15/24</a:t>
             </a:fld>
             <a:endParaRPr lang="en-US"/>
           </a:p>
@@ -2391,7 +2391,7 @@
           <a:p>
             <a:fld id="{C485584D-7D79-4248-9986-4CA35242F944}" type="datetimeFigureOut">
               <a:rPr lang="en-US" smtClean="0"/>
-              <a:t>6/28/24</a:t>
+              <a:t>7/15/24</a:t>
             </a:fld>
             <a:endParaRPr lang="en-US"/>
           </a:p>
@@ -2532,7 +2532,7 @@
           <a:p>
             <a:fld id="{C485584D-7D79-4248-9986-4CA35242F944}" type="datetimeFigureOut">
               <a:rPr lang="en-US" smtClean="0"/>
-              <a:t>6/28/24</a:t>
+              <a:t>7/15/24</a:t>
             </a:fld>
             <a:endParaRPr lang="en-US"/>
           </a:p>
@@ -2645,7 +2645,7 @@
           <a:p>
             <a:fld id="{C485584D-7D79-4248-9986-4CA35242F944}" type="datetimeFigureOut">
               <a:rPr lang="en-US" smtClean="0"/>
-              <a:t>6/28/24</a:t>
+              <a:t>7/15/24</a:t>
             </a:fld>
             <a:endParaRPr lang="en-US"/>
           </a:p>
@@ -2958,7 +2958,7 @@
           <a:p>
             <a:fld id="{C485584D-7D79-4248-9986-4CA35242F944}" type="datetimeFigureOut">
               <a:rPr lang="en-US" smtClean="0"/>
-              <a:t>6/28/24</a:t>
+              <a:t>7/15/24</a:t>
             </a:fld>
             <a:endParaRPr lang="en-US"/>
           </a:p>
@@ -3250,7 +3250,7 @@
           <a:p>
             <a:fld id="{C485584D-7D79-4248-9986-4CA35242F944}" type="datetimeFigureOut">
               <a:rPr lang="en-US" smtClean="0"/>
-              <a:t>6/28/24</a:t>
+              <a:t>7/15/24</a:t>
             </a:fld>
             <a:endParaRPr lang="en-US"/>
           </a:p>
@@ -3534,7 +3534,7 @@
           <a:p>
             <a:fld id="{C485584D-7D79-4248-9986-4CA35242F944}" type="datetimeFigureOut">
               <a:rPr lang="en-US" smtClean="0"/>
-              <a:t>6/28/24</a:t>
+              <a:t>7/15/24</a:t>
             </a:fld>
             <a:endParaRPr lang="en-US"/>
           </a:p>
@@ -5394,8 +5394,8 @@
           <a:chExt cx="0" cy="0"/>
         </a:xfrm>
       </p:grpSpPr>
-      <mc:AlternateContent xmlns:mc="http://schemas.openxmlformats.org/markup-compatibility/2006">
-        <mc:Choice xmlns:a14="http://schemas.microsoft.com/office/drawing/2010/main" Requires="a14">
+      <mc:AlternateContent xmlns:mc="http://schemas.openxmlformats.org/markup-compatibility/2006" xmlns:a14="http://schemas.microsoft.com/office/drawing/2010/main">
+        <mc:Choice Requires="a14">
           <p:sp>
             <p:nvSpPr>
               <p:cNvPr id="3" name="TextBox 2">
@@ -5761,7 +5761,7 @@
             </p:txBody>
           </p:sp>
         </mc:Choice>
-        <mc:Fallback>
+        <mc:Fallback xmlns="">
           <p:sp>
             <p:nvSpPr>
               <p:cNvPr id="3" name="TextBox 2">

</xml_diff>